<commit_message>
A casi terminar la expo
</commit_message>
<xml_diff>
--- a/Metodologia.pptx
+++ b/Metodologia.pptx
@@ -214,7 +214,7 @@
           <a:p>
             <a:fld id="{625CFF48-F70C-4D79-B7AE-8974975F5DCF}" type="datetimeFigureOut">
               <a:rPr lang="es-MX" smtClean="0"/>
-              <a:t>02/06/2024</a:t>
+              <a:t>03/06/2024</a:t>
             </a:fld>
             <a:endParaRPr lang="es-MX"/>
           </a:p>
@@ -1026,7 +1026,7 @@
           <a:p>
             <a:fld id="{4570AB49-6105-4952-8B69-6EB049C14673}" type="datetimeFigureOut">
               <a:rPr lang="es-MX" smtClean="0"/>
-              <a:t>02/06/2024</a:t>
+              <a:t>03/06/2024</a:t>
             </a:fld>
             <a:endParaRPr lang="es-MX"/>
           </a:p>
@@ -1226,7 +1226,7 @@
           <a:p>
             <a:fld id="{4570AB49-6105-4952-8B69-6EB049C14673}" type="datetimeFigureOut">
               <a:rPr lang="es-MX" smtClean="0"/>
-              <a:t>02/06/2024</a:t>
+              <a:t>03/06/2024</a:t>
             </a:fld>
             <a:endParaRPr lang="es-MX"/>
           </a:p>
@@ -1436,7 +1436,7 @@
           <a:p>
             <a:fld id="{4570AB49-6105-4952-8B69-6EB049C14673}" type="datetimeFigureOut">
               <a:rPr lang="es-MX" smtClean="0"/>
-              <a:t>02/06/2024</a:t>
+              <a:t>03/06/2024</a:t>
             </a:fld>
             <a:endParaRPr lang="es-MX"/>
           </a:p>
@@ -1636,7 +1636,7 @@
           <a:p>
             <a:fld id="{4570AB49-6105-4952-8B69-6EB049C14673}" type="datetimeFigureOut">
               <a:rPr lang="es-MX" smtClean="0"/>
-              <a:t>02/06/2024</a:t>
+              <a:t>03/06/2024</a:t>
             </a:fld>
             <a:endParaRPr lang="es-MX"/>
           </a:p>
@@ -1912,7 +1912,7 @@
           <a:p>
             <a:fld id="{4570AB49-6105-4952-8B69-6EB049C14673}" type="datetimeFigureOut">
               <a:rPr lang="es-MX" smtClean="0"/>
-              <a:t>02/06/2024</a:t>
+              <a:t>03/06/2024</a:t>
             </a:fld>
             <a:endParaRPr lang="es-MX"/>
           </a:p>
@@ -2180,7 +2180,7 @@
           <a:p>
             <a:fld id="{4570AB49-6105-4952-8B69-6EB049C14673}" type="datetimeFigureOut">
               <a:rPr lang="es-MX" smtClean="0"/>
-              <a:t>02/06/2024</a:t>
+              <a:t>03/06/2024</a:t>
             </a:fld>
             <a:endParaRPr lang="es-MX"/>
           </a:p>
@@ -2595,7 +2595,7 @@
           <a:p>
             <a:fld id="{4570AB49-6105-4952-8B69-6EB049C14673}" type="datetimeFigureOut">
               <a:rPr lang="es-MX" smtClean="0"/>
-              <a:t>02/06/2024</a:t>
+              <a:t>03/06/2024</a:t>
             </a:fld>
             <a:endParaRPr lang="es-MX"/>
           </a:p>
@@ -2737,7 +2737,7 @@
           <a:p>
             <a:fld id="{4570AB49-6105-4952-8B69-6EB049C14673}" type="datetimeFigureOut">
               <a:rPr lang="es-MX" smtClean="0"/>
-              <a:t>02/06/2024</a:t>
+              <a:t>03/06/2024</a:t>
             </a:fld>
             <a:endParaRPr lang="es-MX"/>
           </a:p>
@@ -2850,7 +2850,7 @@
           <a:p>
             <a:fld id="{4570AB49-6105-4952-8B69-6EB049C14673}" type="datetimeFigureOut">
               <a:rPr lang="es-MX" smtClean="0"/>
-              <a:t>02/06/2024</a:t>
+              <a:t>03/06/2024</a:t>
             </a:fld>
             <a:endParaRPr lang="es-MX"/>
           </a:p>
@@ -3163,7 +3163,7 @@
           <a:p>
             <a:fld id="{4570AB49-6105-4952-8B69-6EB049C14673}" type="datetimeFigureOut">
               <a:rPr lang="es-MX" smtClean="0"/>
-              <a:t>02/06/2024</a:t>
+              <a:t>03/06/2024</a:t>
             </a:fld>
             <a:endParaRPr lang="es-MX"/>
           </a:p>
@@ -3452,7 +3452,7 @@
           <a:p>
             <a:fld id="{4570AB49-6105-4952-8B69-6EB049C14673}" type="datetimeFigureOut">
               <a:rPr lang="es-MX" smtClean="0"/>
-              <a:t>02/06/2024</a:t>
+              <a:t>03/06/2024</a:t>
             </a:fld>
             <a:endParaRPr lang="es-MX"/>
           </a:p>
@@ -3695,7 +3695,7 @@
           <a:p>
             <a:fld id="{4570AB49-6105-4952-8B69-6EB049C14673}" type="datetimeFigureOut">
               <a:rPr lang="es-MX" smtClean="0"/>
-              <a:t>02/06/2024</a:t>
+              <a:t>03/06/2024</a:t>
             </a:fld>
             <a:endParaRPr lang="es-MX"/>
           </a:p>
@@ -9384,8 +9384,8 @@
         </p:nvSpPr>
         <p:spPr>
           <a:xfrm>
-            <a:off x="4254910" y="1608217"/>
-            <a:ext cx="1511710" cy="553781"/>
+            <a:off x="4254909" y="1608217"/>
+            <a:ext cx="2873478" cy="553781"/>
           </a:xfrm>
           <a:prstGeom prst="rect">
             <a:avLst/>
@@ -9393,7 +9393,7 @@
         </p:spPr>
         <p:txBody>
           <a:bodyPr vert="horz" lIns="91440" tIns="45720" rIns="91440" bIns="45720" rtlCol="0">
-            <a:normAutofit/>
+            <a:normAutofit fontScale="85000" lnSpcReduction="10000"/>
           </a:bodyPr>
           <a:lstStyle>
             <a:lvl1pPr marL="228600" indent="-228600" algn="l" defTabSz="914400" rtl="0" eaLnBrk="1" latinLnBrk="0" hangingPunct="1">
@@ -9562,14 +9562,21 @@
           <a:p>
             <a:r>
               <a:rPr lang="es-MX" dirty="0"/>
-              <a:t>EGFR</a:t>
-            </a:r>
-          </a:p>
-          <a:p>
-            <a:pPr marL="0" indent="0">
-              <a:buFont typeface="Arial" panose="020B0604020202020204" pitchFamily="34" charset="0"/>
-              <a:buNone/>
-            </a:pPr>
+              <a:t>EGFR, </a:t>
+            </a:r>
+            <a:r>
+              <a:rPr lang="es-MX" b="1" i="0" dirty="0">
+                <a:solidFill>
+                  <a:srgbClr val="ECECEC"/>
+                </a:solidFill>
+                <a:effectLst/>
+                <a:highlight>
+                  <a:srgbClr val="212121"/>
+                </a:highlight>
+                <a:latin typeface="ui-sans-serif"/>
+              </a:rPr>
+              <a:t>4I23, 5WB7 </a:t>
+            </a:r>
             <a:endParaRPr lang="es-MX" dirty="0"/>
           </a:p>
         </p:txBody>
@@ -9591,7 +9598,7 @@
         <p:spPr>
           <a:xfrm>
             <a:off x="8281220" y="1608217"/>
-            <a:ext cx="1511710" cy="553781"/>
+            <a:ext cx="2170470" cy="553781"/>
           </a:xfrm>
           <a:prstGeom prst="rect">
             <a:avLst/>
@@ -9599,7 +9606,7 @@
         </p:spPr>
         <p:txBody>
           <a:bodyPr vert="horz" lIns="91440" tIns="45720" rIns="91440" bIns="45720" rtlCol="0">
-            <a:normAutofit/>
+            <a:normAutofit fontScale="70000" lnSpcReduction="20000"/>
           </a:bodyPr>
           <a:lstStyle>
             <a:lvl1pPr marL="228600" indent="-228600" algn="l" defTabSz="914400" rtl="0" eaLnBrk="1" latinLnBrk="0" hangingPunct="1">
@@ -9768,7 +9775,7 @@
           <a:p>
             <a:r>
               <a:rPr lang="es-MX" dirty="0"/>
-              <a:t>SRC</a:t>
+              <a:t>SRC: 2DBJ, 4I23</a:t>
             </a:r>
           </a:p>
           <a:p>
@@ -9797,7 +9804,7 @@
         <p:spPr>
           <a:xfrm>
             <a:off x="1743678" y="4537705"/>
-            <a:ext cx="1511710" cy="553781"/>
+            <a:ext cx="2208890" cy="553781"/>
           </a:xfrm>
           <a:prstGeom prst="rect">
             <a:avLst/>
@@ -9805,7 +9812,7 @@
         </p:spPr>
         <p:txBody>
           <a:bodyPr vert="horz" lIns="91440" tIns="45720" rIns="91440" bIns="45720" rtlCol="0">
-            <a:normAutofit/>
+            <a:normAutofit fontScale="85000" lnSpcReduction="10000"/>
           </a:bodyPr>
           <a:lstStyle>
             <a:lvl1pPr marL="228600" indent="-228600" algn="l" defTabSz="914400" rtl="0" eaLnBrk="1" latinLnBrk="0" hangingPunct="1">
@@ -9974,7 +9981,7 @@
           <a:p>
             <a:r>
               <a:rPr lang="es-MX" dirty="0"/>
-              <a:t>MAPK1</a:t>
+              <a:t>MAPK1:3W55 </a:t>
             </a:r>
           </a:p>
           <a:p>
@@ -10002,8 +10009,8 @@
         </p:nvSpPr>
         <p:spPr>
           <a:xfrm>
-            <a:off x="6491428" y="3839614"/>
-            <a:ext cx="1511710" cy="553781"/>
+            <a:off x="6491427" y="3839614"/>
+            <a:ext cx="3763618" cy="553781"/>
           </a:xfrm>
           <a:prstGeom prst="rect">
             <a:avLst/>
@@ -10180,7 +10187,7 @@
           <a:p>
             <a:r>
               <a:rPr lang="es-MX" dirty="0"/>
-              <a:t>ESR1</a:t>
+              <a:t>ESR1: 5ACC, 3OS8 </a:t>
             </a:r>
           </a:p>
           <a:p>
@@ -10192,36 +10199,6 @@
           </a:p>
         </p:txBody>
       </p:sp>
-      <p:pic>
-        <p:nvPicPr>
-          <p:cNvPr id="10" name="Imagen 9">
-            <a:extLst>
-              <a:ext uri="{FF2B5EF4-FFF2-40B4-BE49-F238E27FC236}">
-                <a16:creationId xmlns:a16="http://schemas.microsoft.com/office/drawing/2014/main" id="{3BC6A151-8C42-52F3-9998-48630F9B0508}"/>
-              </a:ext>
-            </a:extLst>
-          </p:cNvPr>
-          <p:cNvPicPr>
-            <a:picLocks noChangeAspect="1"/>
-          </p:cNvPicPr>
-          <p:nvPr/>
-        </p:nvPicPr>
-        <p:blipFill>
-          <a:blip r:embed="rId2"/>
-          <a:stretch>
-            <a:fillRect/>
-          </a:stretch>
-        </p:blipFill>
-        <p:spPr>
-          <a:xfrm>
-            <a:off x="751701" y="2082530"/>
-            <a:ext cx="1585763" cy="2531002"/>
-          </a:xfrm>
-          <a:prstGeom prst="rect">
-            <a:avLst/>
-          </a:prstGeom>
-        </p:spPr>
-      </p:pic>
     </p:spTree>
     <p:extLst>
       <p:ext uri="{BB962C8B-B14F-4D97-AF65-F5344CB8AC3E}">

</xml_diff>